<commit_message>
Add future ideas to Presentation
</commit_message>
<xml_diff>
--- a/Presentation and Documentation/Presentation.pptx
+++ b/Presentation and Documentation/Presentation.pptx
@@ -5,7 +5,7 @@
     <p:sldMasterId id="2147483671" r:id="rId1"/>
   </p:sldMasterIdLst>
   <p:notesMasterIdLst>
-    <p:notesMasterId r:id="rId11"/>
+    <p:notesMasterId r:id="rId12"/>
   </p:notesMasterIdLst>
   <p:sldIdLst>
     <p:sldId id="256" r:id="rId2"/>
@@ -15,36 +15,37 @@
     <p:sldId id="275" r:id="rId6"/>
     <p:sldId id="277" r:id="rId7"/>
     <p:sldId id="276" r:id="rId8"/>
-    <p:sldId id="279" r:id="rId9"/>
-    <p:sldId id="280" r:id="rId10"/>
+    <p:sldId id="281" r:id="rId9"/>
+    <p:sldId id="279" r:id="rId10"/>
+    <p:sldId id="280" r:id="rId11"/>
   </p:sldIdLst>
   <p:sldSz cx="9144000" cy="5143500" type="screen16x9"/>
   <p:notesSz cx="6858000" cy="9144000"/>
   <p:embeddedFontLst>
     <p:embeddedFont>
-      <p:font typeface="Lobster" panose="020B0604020202020204" charset="0"/>
-      <p:regular r:id="rId12"/>
-    </p:embeddedFont>
-    <p:embeddedFont>
-      <p:font typeface="Raleway" pitchFamily="2" charset="0"/>
+      <p:font typeface="Raleway" charset="-52"/>
       <p:regular r:id="rId13"/>
       <p:bold r:id="rId14"/>
       <p:italic r:id="rId15"/>
       <p:boldItalic r:id="rId16"/>
     </p:embeddedFont>
     <p:embeddedFont>
-      <p:font typeface="Raleway Medium" pitchFamily="2" charset="0"/>
+      <p:font typeface="Raleway SemiBold" charset="-52"/>
       <p:regular r:id="rId17"/>
       <p:bold r:id="rId18"/>
       <p:italic r:id="rId19"/>
       <p:boldItalic r:id="rId20"/>
     </p:embeddedFont>
     <p:embeddedFont>
-      <p:font typeface="Raleway SemiBold" pitchFamily="2" charset="0"/>
+      <p:font typeface="Lobster" charset="-52"/>
       <p:regular r:id="rId21"/>
-      <p:bold r:id="rId22"/>
-      <p:italic r:id="rId23"/>
-      <p:boldItalic r:id="rId24"/>
+    </p:embeddedFont>
+    <p:embeddedFont>
+      <p:font typeface="Raleway Medium" charset="-52"/>
+      <p:regular r:id="rId22"/>
+      <p:bold r:id="rId23"/>
+      <p:italic r:id="rId24"/>
+      <p:boldItalic r:id="rId25"/>
     </p:embeddedFont>
   </p:embeddedFontLst>
   <p:defaultTextStyle>
@@ -278,7 +279,7 @@
   </p:defaultTextStyle>
   <p:extLst>
     <p:ext uri="{EFAFB233-063F-42B5-8137-9DF3F51BA10A}">
-      <p15:sldGuideLst xmlns:p15="http://schemas.microsoft.com/office/powerpoint/2012/main"/>
+      <p15:sldGuideLst xmlns:p15="http://schemas.microsoft.com/office/powerpoint/2012/main" xmlns=""/>
     </p:ext>
   </p:extLst>
 </p:presentation>
@@ -491,6 +492,11 @@
         </p:txBody>
       </p:sp>
     </p:spTree>
+    <p:extLst>
+      <p:ext uri="{BB962C8B-B14F-4D97-AF65-F5344CB8AC3E}">
+        <p14:creationId xmlns:p14="http://schemas.microsoft.com/office/powerpoint/2010/main" val="423928465"/>
+      </p:ext>
+    </p:extLst>
   </p:cSld>
   <p:clrMap bg1="lt1" tx1="dk1" bg2="dk2" tx2="lt2" accent1="accent1" accent2="accent2" accent3="accent3" accent4="accent4" accent5="accent5" accent6="accent6" hlink="hlink" folHlink="folHlink"/>
   <p:notesStyle>
@@ -1567,6 +1573,115 @@
     </p:spTree>
     <p:extLst>
       <p:ext uri="{BB962C8B-B14F-4D97-AF65-F5344CB8AC3E}">
+        <p14:creationId xmlns:p14="http://schemas.microsoft.com/office/powerpoint/2010/main" val="3558162572"/>
+      </p:ext>
+    </p:extLst>
+  </p:cSld>
+  <p:clrMapOvr>
+    <a:masterClrMapping/>
+  </p:clrMapOvr>
+</p:notes>
+</file>
+
+<file path=ppt/notesSlides/notesSlide9.xml><?xml version="1.0" encoding="utf-8"?>
+<p:notes xmlns:a="http://schemas.openxmlformats.org/drawingml/2006/main" xmlns:r="http://schemas.openxmlformats.org/officeDocument/2006/relationships" xmlns:p="http://schemas.openxmlformats.org/presentationml/2006/main" showMasterSp="0" showMasterPhAnim="0">
+  <p:cSld>
+    <p:spTree>
+      <p:nvGrpSpPr>
+        <p:cNvPr id="1" name="Shape 877"/>
+        <p:cNvGrpSpPr/>
+        <p:nvPr/>
+      </p:nvGrpSpPr>
+      <p:grpSpPr>
+        <a:xfrm>
+          <a:off x="0" y="0"/>
+          <a:ext cx="0" cy="0"/>
+          <a:chOff x="0" y="0"/>
+          <a:chExt cx="0" cy="0"/>
+        </a:xfrm>
+      </p:grpSpPr>
+      <p:sp>
+        <p:nvSpPr>
+          <p:cNvPr id="878" name="Google Shape;878;g640b5c75b4_0_519:notes"/>
+          <p:cNvSpPr>
+            <a:spLocks noGrp="1" noRot="1" noChangeAspect="1"/>
+          </p:cNvSpPr>
+          <p:nvPr>
+            <p:ph type="sldImg" idx="2"/>
+          </p:nvPr>
+        </p:nvSpPr>
+        <p:spPr>
+          <a:xfrm>
+            <a:off x="381000" y="685800"/>
+            <a:ext cx="6096000" cy="3429000"/>
+          </a:xfrm>
+          <a:custGeom>
+            <a:avLst/>
+            <a:gdLst/>
+            <a:ahLst/>
+            <a:cxnLst/>
+            <a:rect l="l" t="t" r="r" b="b"/>
+            <a:pathLst>
+              <a:path w="120000" h="120000" extrusionOk="0">
+                <a:moveTo>
+                  <a:pt x="0" y="0"/>
+                </a:moveTo>
+                <a:lnTo>
+                  <a:pt x="120000" y="0"/>
+                </a:lnTo>
+                <a:lnTo>
+                  <a:pt x="120000" y="120000"/>
+                </a:lnTo>
+                <a:lnTo>
+                  <a:pt x="0" y="120000"/>
+                </a:lnTo>
+                <a:close/>
+              </a:path>
+            </a:pathLst>
+          </a:custGeom>
+        </p:spPr>
+      </p:sp>
+      <p:sp>
+        <p:nvSpPr>
+          <p:cNvPr id="879" name="Google Shape;879;g640b5c75b4_0_519:notes"/>
+          <p:cNvSpPr txBox="1">
+            <a:spLocks noGrp="1"/>
+          </p:cNvSpPr>
+          <p:nvPr>
+            <p:ph type="body" idx="1"/>
+          </p:nvPr>
+        </p:nvSpPr>
+        <p:spPr>
+          <a:xfrm>
+            <a:off x="685800" y="4343400"/>
+            <a:ext cx="5486400" cy="4114800"/>
+          </a:xfrm>
+          <a:prstGeom prst="rect">
+            <a:avLst/>
+          </a:prstGeom>
+        </p:spPr>
+        <p:txBody>
+          <a:bodyPr spcFirstLastPara="1" wrap="square" lIns="91425" tIns="91425" rIns="91425" bIns="91425" anchor="t" anchorCtr="0">
+            <a:noAutofit/>
+          </a:bodyPr>
+          <a:lstStyle/>
+          <a:p>
+            <a:pPr marL="0" lvl="0" indent="0" algn="l" rtl="0">
+              <a:spcBef>
+                <a:spcPts val="0"/>
+              </a:spcBef>
+              <a:spcAft>
+                <a:spcPts val="0"/>
+              </a:spcAft>
+              <a:buNone/>
+            </a:pPr>
+            <a:endParaRPr/>
+          </a:p>
+        </p:txBody>
+      </p:sp>
+    </p:spTree>
+    <p:extLst>
+      <p:ext uri="{BB962C8B-B14F-4D97-AF65-F5344CB8AC3E}">
         <p14:creationId xmlns:p14="http://schemas.microsoft.com/office/powerpoint/2010/main" val="3223442251"/>
       </p:ext>
     </p:extLst>
@@ -3246,7 +3361,7 @@
   </p:clrMapOvr>
   <p:extLst>
     <p:ext uri="{DCECCB84-F9BA-43D5-87BE-67443E8EF086}">
-      <p15:sldGuideLst xmlns:p15="http://schemas.microsoft.com/office/powerpoint/2012/main">
+      <p15:sldGuideLst xmlns:p15="http://schemas.microsoft.com/office/powerpoint/2012/main" xmlns="">
         <p15:guide id="1" orient="horz" pos="1620">
           <p15:clr>
             <a:srgbClr val="FA7B17"/>
@@ -18191,6 +18306,69 @@
 </p:sld>
 </file>
 
+<file path=ppt/slides/slide10.xml><?xml version="1.0" encoding="utf-8"?>
+<p:sld xmlns:a="http://schemas.openxmlformats.org/drawingml/2006/main" xmlns:r="http://schemas.openxmlformats.org/officeDocument/2006/relationships" xmlns:p="http://schemas.openxmlformats.org/presentationml/2006/main">
+  <p:cSld>
+    <p:spTree>
+      <p:nvGrpSpPr>
+        <p:cNvPr id="1" name=""/>
+        <p:cNvGrpSpPr/>
+        <p:nvPr/>
+      </p:nvGrpSpPr>
+      <p:grpSpPr>
+        <a:xfrm>
+          <a:off x="0" y="0"/>
+          <a:ext cx="0" cy="0"/>
+          <a:chOff x="0" y="0"/>
+          <a:chExt cx="0" cy="0"/>
+        </a:xfrm>
+      </p:grpSpPr>
+      <p:sp>
+        <p:nvSpPr>
+          <p:cNvPr id="2" name="Title 1">
+            <a:extLst>
+              <a:ext uri="{FF2B5EF4-FFF2-40B4-BE49-F238E27FC236}">
+                <a16:creationId xmlns:a16="http://schemas.microsoft.com/office/drawing/2014/main" xmlns="" id="{3CAF83E6-3923-4A82-B08B-7E23FE183235}"/>
+              </a:ext>
+            </a:extLst>
+          </p:cNvPr>
+          <p:cNvSpPr>
+            <a:spLocks noGrp="1"/>
+          </p:cNvSpPr>
+          <p:nvPr>
+            <p:ph type="ctrTitle"/>
+          </p:nvPr>
+        </p:nvSpPr>
+        <p:spPr>
+          <a:xfrm>
+            <a:off x="2230800" y="1979100"/>
+            <a:ext cx="4682400" cy="1185300"/>
+          </a:xfrm>
+        </p:spPr>
+        <p:txBody>
+          <a:bodyPr/>
+          <a:lstStyle/>
+          <a:p>
+            <a:r>
+              <a:rPr lang="en-US" sz="6600" dirty="0"/>
+              <a:t>Thank you for your attention</a:t>
+            </a:r>
+          </a:p>
+        </p:txBody>
+      </p:sp>
+    </p:spTree>
+    <p:extLst>
+      <p:ext uri="{BB962C8B-B14F-4D97-AF65-F5344CB8AC3E}">
+        <p14:creationId xmlns:p14="http://schemas.microsoft.com/office/powerpoint/2010/main" val="3950838050"/>
+      </p:ext>
+    </p:extLst>
+  </p:cSld>
+  <p:clrMapOvr>
+    <a:masterClrMapping/>
+  </p:clrMapOvr>
+</p:sld>
+</file>
+
 <file path=ppt/slides/slide2.xml><?xml version="1.0" encoding="utf-8"?>
 <p:sld xmlns:a="http://schemas.openxmlformats.org/drawingml/2006/main" xmlns:r="http://schemas.openxmlformats.org/officeDocument/2006/relationships" xmlns:p="http://schemas.openxmlformats.org/presentationml/2006/main">
   <p:cSld>
@@ -18220,7 +18398,7 @@
         </p:nvSpPr>
         <p:spPr>
           <a:xfrm>
-            <a:off x="2749151" y="1305550"/>
+            <a:off x="497523" y="2037070"/>
             <a:ext cx="3334800" cy="484248"/>
           </a:xfrm>
           <a:prstGeom prst="rect">
@@ -18262,7 +18440,7 @@
         </p:nvSpPr>
         <p:spPr>
           <a:xfrm>
-            <a:off x="1768563" y="1886979"/>
+            <a:off x="530606" y="2724007"/>
             <a:ext cx="698406" cy="234274"/>
           </a:xfrm>
           <a:prstGeom prst="rect">
@@ -18314,7 +18492,7 @@
         </p:nvSpPr>
         <p:spPr>
           <a:xfrm>
-            <a:off x="1829802" y="2279540"/>
+            <a:off x="521506" y="3266547"/>
             <a:ext cx="865200" cy="495144"/>
           </a:xfrm>
           <a:prstGeom prst="rect">
@@ -18366,7 +18544,7 @@
         </p:nvSpPr>
         <p:spPr>
           <a:xfrm>
-            <a:off x="1801317" y="1144275"/>
+            <a:off x="513849" y="1889862"/>
             <a:ext cx="826236" cy="807957"/>
           </a:xfrm>
           <a:prstGeom prst="rect">
@@ -18418,7 +18596,7 @@
         </p:nvSpPr>
         <p:spPr>
           <a:xfrm>
-            <a:off x="2941653" y="1706759"/>
+            <a:off x="290911" y="2501584"/>
             <a:ext cx="2949795" cy="709603"/>
           </a:xfrm>
           <a:prstGeom prst="rect">
@@ -18460,7 +18638,7 @@
         </p:nvSpPr>
         <p:spPr>
           <a:xfrm>
-            <a:off x="1829045" y="2779999"/>
+            <a:off x="471512" y="3840254"/>
             <a:ext cx="909721" cy="643986"/>
           </a:xfrm>
           <a:prstGeom prst="rect">
@@ -18512,7 +18690,7 @@
         </p:nvSpPr>
         <p:spPr>
           <a:xfrm>
-            <a:off x="2056550" y="451702"/>
+            <a:off x="2056500" y="268822"/>
             <a:ext cx="5031000" cy="886500"/>
           </a:xfrm>
           <a:prstGeom prst="rect">
@@ -18535,10 +18713,10 @@
               <a:buNone/>
             </a:pPr>
             <a:r>
-              <a:rPr lang="en"/>
+              <a:rPr lang="en" dirty="0"/>
               <a:t>Table of Contents</a:t>
             </a:r>
-            <a:endParaRPr/>
+            <a:endParaRPr dirty="0"/>
           </a:p>
         </p:txBody>
       </p:sp>
@@ -18554,7 +18732,7 @@
         </p:nvSpPr>
         <p:spPr>
           <a:xfrm>
-            <a:off x="2852052" y="2235147"/>
+            <a:off x="656544" y="3329375"/>
             <a:ext cx="3442421" cy="495144"/>
           </a:xfrm>
           <a:prstGeom prst="rect">
@@ -18596,7 +18774,7 @@
         </p:nvSpPr>
         <p:spPr>
           <a:xfrm>
-            <a:off x="2904600" y="2709437"/>
+            <a:off x="871818" y="3807779"/>
             <a:ext cx="3334800" cy="867510"/>
           </a:xfrm>
           <a:prstGeom prst="rect">
@@ -18631,7 +18809,7 @@
           <p:cNvPr id="26" name="TextBox 25">
             <a:extLst>
               <a:ext uri="{FF2B5EF4-FFF2-40B4-BE49-F238E27FC236}">
-                <a16:creationId xmlns:a16="http://schemas.microsoft.com/office/drawing/2014/main" id="{E8747C3D-0F4B-44E3-AD3F-09E758E83322}"/>
+                <a16:creationId xmlns:a16="http://schemas.microsoft.com/office/drawing/2014/main" xmlns="" id="{E8747C3D-0F4B-44E3-AD3F-09E758E83322}"/>
               </a:ext>
             </a:extLst>
           </p:cNvPr>
@@ -18640,7 +18818,7 @@
         </p:nvSpPr>
         <p:spPr>
           <a:xfrm>
-            <a:off x="1839646" y="3514119"/>
+            <a:off x="5189074" y="2035311"/>
             <a:ext cx="865200" cy="523220"/>
           </a:xfrm>
           <a:prstGeom prst="rect">
@@ -18681,7 +18859,7 @@
           <p:cNvPr id="32" name="TextBox 31">
             <a:extLst>
               <a:ext uri="{FF2B5EF4-FFF2-40B4-BE49-F238E27FC236}">
-                <a16:creationId xmlns:a16="http://schemas.microsoft.com/office/drawing/2014/main" id="{D42BD856-420C-4754-883D-55C3CC3C2B8B}"/>
+                <a16:creationId xmlns:a16="http://schemas.microsoft.com/office/drawing/2014/main" xmlns="" id="{D42BD856-420C-4754-883D-55C3CC3C2B8B}"/>
               </a:ext>
             </a:extLst>
           </p:cNvPr>
@@ -18690,7 +18868,7 @@
         </p:nvSpPr>
         <p:spPr>
           <a:xfrm>
-            <a:off x="3089726" y="3576947"/>
+            <a:off x="5453098" y="2096866"/>
             <a:ext cx="2964548" cy="461665"/>
           </a:xfrm>
           <a:prstGeom prst="rect">
@@ -18728,7 +18906,7 @@
           <p:cNvPr id="34" name="TextBox 33">
             <a:extLst>
               <a:ext uri="{FF2B5EF4-FFF2-40B4-BE49-F238E27FC236}">
-                <a16:creationId xmlns:a16="http://schemas.microsoft.com/office/drawing/2014/main" id="{41321D71-43D5-4318-A3B4-4089D4ABDA64}"/>
+                <a16:creationId xmlns:a16="http://schemas.microsoft.com/office/drawing/2014/main" xmlns="" id="{41321D71-43D5-4318-A3B4-4089D4ABDA64}"/>
               </a:ext>
             </a:extLst>
           </p:cNvPr>
@@ -18737,7 +18915,7 @@
         </p:nvSpPr>
         <p:spPr>
           <a:xfrm>
-            <a:off x="3318454" y="4165051"/>
+            <a:off x="5844652" y="3359314"/>
             <a:ext cx="2572994" cy="461665"/>
           </a:xfrm>
           <a:prstGeom prst="rect">
@@ -18775,7 +18953,7 @@
           <p:cNvPr id="36" name="TextBox 35">
             <a:extLst>
               <a:ext uri="{FF2B5EF4-FFF2-40B4-BE49-F238E27FC236}">
-                <a16:creationId xmlns:a16="http://schemas.microsoft.com/office/drawing/2014/main" id="{093E62C1-2C68-44D0-A4DF-3927B8A3ED7B}"/>
+                <a16:creationId xmlns:a16="http://schemas.microsoft.com/office/drawing/2014/main" xmlns="" id="{093E62C1-2C68-44D0-A4DF-3927B8A3ED7B}"/>
               </a:ext>
             </a:extLst>
           </p:cNvPr>
@@ -18784,7 +18962,7 @@
         </p:nvSpPr>
         <p:spPr>
           <a:xfrm>
-            <a:off x="1839646" y="4126373"/>
+            <a:off x="5189074" y="2716151"/>
             <a:ext cx="678691" cy="523220"/>
           </a:xfrm>
           <a:prstGeom prst="rect">
@@ -18809,6 +18987,198 @@
               <a:t>06</a:t>
             </a:r>
             <a:endParaRPr lang="en-US" sz="2800" dirty="0"/>
+          </a:p>
+        </p:txBody>
+      </p:sp>
+      <p:sp>
+        <p:nvSpPr>
+          <p:cNvPr id="15" name="TextBox 35">
+            <a:extLst>
+              <a:ext uri="{FF2B5EF4-FFF2-40B4-BE49-F238E27FC236}">
+                <a16:creationId xmlns:a16="http://schemas.microsoft.com/office/drawing/2014/main" xmlns="" id="{093E62C1-2C68-44D0-A4DF-3927B8A3ED7B}"/>
+              </a:ext>
+            </a:extLst>
+          </p:cNvPr>
+          <p:cNvSpPr txBox="1"/>
+          <p:nvPr/>
+        </p:nvSpPr>
+        <p:spPr>
+          <a:xfrm>
+            <a:off x="5189074" y="3279565"/>
+            <a:ext cx="678691" cy="523220"/>
+          </a:xfrm>
+          <a:prstGeom prst="rect">
+            <a:avLst/>
+          </a:prstGeom>
+          <a:noFill/>
+        </p:spPr>
+        <p:txBody>
+          <a:bodyPr wrap="square">
+            <a:spAutoFit/>
+          </a:bodyPr>
+          <a:lstStyle/>
+          <a:p>
+            <a:r>
+              <a:rPr lang="en" sz="2800" dirty="0" smtClean="0">
+                <a:solidFill>
+                  <a:schemeClr val="lt1"/>
+                </a:solidFill>
+                <a:latin typeface="Raleway SemiBold"/>
+                <a:sym typeface="Raleway SemiBold"/>
+              </a:rPr>
+              <a:t>07</a:t>
+            </a:r>
+            <a:endParaRPr lang="en-US" sz="2800" dirty="0"/>
+          </a:p>
+        </p:txBody>
+      </p:sp>
+      <p:sp>
+        <p:nvSpPr>
+          <p:cNvPr id="16" name="TextBox 33">
+            <a:extLst>
+              <a:ext uri="{FF2B5EF4-FFF2-40B4-BE49-F238E27FC236}">
+                <a16:creationId xmlns:a16="http://schemas.microsoft.com/office/drawing/2014/main" xmlns="" id="{41321D71-43D5-4318-A3B4-4089D4ABDA64}"/>
+              </a:ext>
+            </a:extLst>
+          </p:cNvPr>
+          <p:cNvSpPr txBox="1"/>
+          <p:nvPr/>
+        </p:nvSpPr>
+        <p:spPr>
+          <a:xfrm>
+            <a:off x="5621674" y="2692036"/>
+            <a:ext cx="2572994" cy="461665"/>
+          </a:xfrm>
+          <a:prstGeom prst="rect">
+            <a:avLst/>
+          </a:prstGeom>
+          <a:noFill/>
+        </p:spPr>
+        <p:txBody>
+          <a:bodyPr wrap="square">
+            <a:spAutoFit/>
+          </a:bodyPr>
+          <a:lstStyle/>
+          <a:p>
+            <a:pPr algn="ctr">
+              <a:buClr>
+                <a:schemeClr val="dk1"/>
+              </a:buClr>
+              <a:buSzPts val="1800"/>
+            </a:pPr>
+            <a:r>
+              <a:rPr lang="en-US" sz="2400" dirty="0" smtClean="0">
+                <a:solidFill>
+                  <a:schemeClr val="accent1"/>
+                </a:solidFill>
+                <a:latin typeface="Lobster"/>
+                <a:sym typeface="Lobster"/>
+              </a:rPr>
+              <a:t>Future Ideas</a:t>
+            </a:r>
+            <a:endParaRPr lang="en-US" sz="2400" dirty="0">
+              <a:solidFill>
+                <a:schemeClr val="accent1"/>
+              </a:solidFill>
+              <a:latin typeface="Lobster"/>
+              <a:sym typeface="Lobster"/>
+            </a:endParaRPr>
+          </a:p>
+        </p:txBody>
+      </p:sp>
+      <p:sp>
+        <p:nvSpPr>
+          <p:cNvPr id="18" name="TextBox 35">
+            <a:extLst>
+              <a:ext uri="{FF2B5EF4-FFF2-40B4-BE49-F238E27FC236}">
+                <a16:creationId xmlns:a16="http://schemas.microsoft.com/office/drawing/2014/main" xmlns="" id="{093E62C1-2C68-44D0-A4DF-3927B8A3ED7B}"/>
+              </a:ext>
+            </a:extLst>
+          </p:cNvPr>
+          <p:cNvSpPr txBox="1"/>
+          <p:nvPr/>
+        </p:nvSpPr>
+        <p:spPr>
+          <a:xfrm>
+            <a:off x="5189074" y="3882131"/>
+            <a:ext cx="678691" cy="523220"/>
+          </a:xfrm>
+          <a:prstGeom prst="rect">
+            <a:avLst/>
+          </a:prstGeom>
+          <a:noFill/>
+        </p:spPr>
+        <p:txBody>
+          <a:bodyPr wrap="square">
+            <a:spAutoFit/>
+          </a:bodyPr>
+          <a:lstStyle/>
+          <a:p>
+            <a:r>
+              <a:rPr lang="en" sz="2800" dirty="0" smtClean="0">
+                <a:solidFill>
+                  <a:schemeClr val="lt1"/>
+                </a:solidFill>
+                <a:latin typeface="Raleway SemiBold"/>
+                <a:sym typeface="Raleway SemiBold"/>
+              </a:rPr>
+              <a:t>08</a:t>
+            </a:r>
+            <a:endParaRPr lang="en-US" sz="2800" dirty="0"/>
+          </a:p>
+        </p:txBody>
+      </p:sp>
+      <p:sp>
+        <p:nvSpPr>
+          <p:cNvPr id="19" name="TextBox 33">
+            <a:extLst>
+              <a:ext uri="{FF2B5EF4-FFF2-40B4-BE49-F238E27FC236}">
+                <a16:creationId xmlns:a16="http://schemas.microsoft.com/office/drawing/2014/main" xmlns="" id="{41321D71-43D5-4318-A3B4-4089D4ABDA64}"/>
+              </a:ext>
+            </a:extLst>
+          </p:cNvPr>
+          <p:cNvSpPr txBox="1"/>
+          <p:nvPr/>
+        </p:nvSpPr>
+        <p:spPr>
+          <a:xfrm>
+            <a:off x="5867765" y="3912908"/>
+            <a:ext cx="2572994" cy="830997"/>
+          </a:xfrm>
+          <a:prstGeom prst="rect">
+            <a:avLst/>
+          </a:prstGeom>
+          <a:noFill/>
+        </p:spPr>
+        <p:txBody>
+          <a:bodyPr wrap="square">
+            <a:spAutoFit/>
+          </a:bodyPr>
+          <a:lstStyle/>
+          <a:p>
+            <a:pPr algn="ctr">
+              <a:buClr>
+                <a:schemeClr val="dk1"/>
+              </a:buClr>
+              <a:buSzPts val="1800"/>
+            </a:pPr>
+            <a:r>
+              <a:rPr lang="en-US" sz="2400" dirty="0" smtClean="0">
+                <a:solidFill>
+                  <a:schemeClr val="accent1"/>
+                </a:solidFill>
+                <a:latin typeface="Lobster"/>
+                <a:sym typeface="Lobster"/>
+              </a:rPr>
+              <a:t>Thank you for the attention</a:t>
+            </a:r>
+            <a:endParaRPr lang="en-US" sz="2400" dirty="0">
+              <a:solidFill>
+                <a:schemeClr val="accent1"/>
+              </a:solidFill>
+              <a:latin typeface="Lobster"/>
+              <a:sym typeface="Lobster"/>
+            </a:endParaRPr>
           </a:p>
         </p:txBody>
       </p:sp>
@@ -18968,7 +19338,7 @@
           <p:cNvPr id="19" name="Picture 2" descr="Image preview">
             <a:extLst>
               <a:ext uri="{FF2B5EF4-FFF2-40B4-BE49-F238E27FC236}">
-                <a16:creationId xmlns:a16="http://schemas.microsoft.com/office/drawing/2014/main" id="{4E81DE51-5289-40D9-8C0B-A3F1ABB47ABE}"/>
+                <a16:creationId xmlns:a16="http://schemas.microsoft.com/office/drawing/2014/main" xmlns="" id="{4E81DE51-5289-40D9-8C0B-A3F1ABB47ABE}"/>
               </a:ext>
             </a:extLst>
           </p:cNvPr>
@@ -19013,7 +19383,7 @@
           <p:cNvPr id="21" name="TextBox 20">
             <a:extLst>
               <a:ext uri="{FF2B5EF4-FFF2-40B4-BE49-F238E27FC236}">
-                <a16:creationId xmlns:a16="http://schemas.microsoft.com/office/drawing/2014/main" id="{30EFED30-289B-4FBD-BDAA-3A43DD8EFBB9}"/>
+                <a16:creationId xmlns:a16="http://schemas.microsoft.com/office/drawing/2014/main" xmlns="" id="{30EFED30-289B-4FBD-BDAA-3A43DD8EFBB9}"/>
               </a:ext>
             </a:extLst>
           </p:cNvPr>
@@ -19114,7 +19484,7 @@
           <p:cNvPr id="7" name="TextBox 6">
             <a:extLst>
               <a:ext uri="{FF2B5EF4-FFF2-40B4-BE49-F238E27FC236}">
-                <a16:creationId xmlns:a16="http://schemas.microsoft.com/office/drawing/2014/main" id="{B3D93428-9E95-4D70-8B3D-8E1CAFAC59BB}"/>
+                <a16:creationId xmlns:a16="http://schemas.microsoft.com/office/drawing/2014/main" xmlns="" id="{B3D93428-9E95-4D70-8B3D-8E1CAFAC59BB}"/>
               </a:ext>
             </a:extLst>
           </p:cNvPr>
@@ -19191,7 +19561,7 @@
           <p:cNvPr id="9" name="TextBox 8">
             <a:extLst>
               <a:ext uri="{FF2B5EF4-FFF2-40B4-BE49-F238E27FC236}">
-                <a16:creationId xmlns:a16="http://schemas.microsoft.com/office/drawing/2014/main" id="{B2EB0840-03FE-46C0-BDA1-6F0ACF5239C1}"/>
+                <a16:creationId xmlns:a16="http://schemas.microsoft.com/office/drawing/2014/main" xmlns="" id="{B2EB0840-03FE-46C0-BDA1-6F0ACF5239C1}"/>
               </a:ext>
             </a:extLst>
           </p:cNvPr>
@@ -19486,7 +19856,7 @@
           <p:cNvPr id="5" name="TextBox 4">
             <a:extLst>
               <a:ext uri="{FF2B5EF4-FFF2-40B4-BE49-F238E27FC236}">
-                <a16:creationId xmlns:a16="http://schemas.microsoft.com/office/drawing/2014/main" id="{E9C626E0-F9A3-4382-A55D-42F854CB1183}"/>
+                <a16:creationId xmlns:a16="http://schemas.microsoft.com/office/drawing/2014/main" xmlns="" id="{E9C626E0-F9A3-4382-A55D-42F854CB1183}"/>
               </a:ext>
             </a:extLst>
           </p:cNvPr>
@@ -19539,7 +19909,7 @@
           <p:cNvPr id="7" name="TextBox 6">
             <a:extLst>
               <a:ext uri="{FF2B5EF4-FFF2-40B4-BE49-F238E27FC236}">
-                <a16:creationId xmlns:a16="http://schemas.microsoft.com/office/drawing/2014/main" id="{B7195EA6-D349-452D-AC84-44279F71EF4D}"/>
+                <a16:creationId xmlns:a16="http://schemas.microsoft.com/office/drawing/2014/main" xmlns="" id="{B7195EA6-D349-452D-AC84-44279F71EF4D}"/>
               </a:ext>
             </a:extLst>
           </p:cNvPr>
@@ -19641,6 +20011,10 @@
               <a:rPr lang="en-US" sz="4000" dirty="0"/>
               <a:t>Apps/Language that we used</a:t>
             </a:r>
+            <a:r>
+              <a:rPr lang="en-US" sz="4800" dirty="0"/>
+              <a:t/>
+            </a:r>
             <a:br>
               <a:rPr lang="en-US" sz="4800" dirty="0"/>
             </a:br>
@@ -19653,7 +20027,7 @@
           <p:cNvPr id="1026" name="Picture 2">
             <a:extLst>
               <a:ext uri="{FF2B5EF4-FFF2-40B4-BE49-F238E27FC236}">
-                <a16:creationId xmlns:a16="http://schemas.microsoft.com/office/drawing/2014/main" id="{EDAC6ADA-4DF6-4E92-B7A4-2C54F78C1B41}"/>
+                <a16:creationId xmlns:a16="http://schemas.microsoft.com/office/drawing/2014/main" xmlns="" id="{EDAC6ADA-4DF6-4E92-B7A4-2C54F78C1B41}"/>
               </a:ext>
             </a:extLst>
           </p:cNvPr>
@@ -19700,7 +20074,7 @@
           <p:cNvPr id="1028" name="Picture 4">
             <a:extLst>
               <a:ext uri="{FF2B5EF4-FFF2-40B4-BE49-F238E27FC236}">
-                <a16:creationId xmlns:a16="http://schemas.microsoft.com/office/drawing/2014/main" id="{7F0A1FC5-82F9-4902-B2BB-5704C15B2026}"/>
+                <a16:creationId xmlns:a16="http://schemas.microsoft.com/office/drawing/2014/main" xmlns="" id="{7F0A1FC5-82F9-4902-B2BB-5704C15B2026}"/>
               </a:ext>
             </a:extLst>
           </p:cNvPr>
@@ -19747,7 +20121,7 @@
           <p:cNvPr id="1030" name="Picture 6">
             <a:extLst>
               <a:ext uri="{FF2B5EF4-FFF2-40B4-BE49-F238E27FC236}">
-                <a16:creationId xmlns:a16="http://schemas.microsoft.com/office/drawing/2014/main" id="{082DB5B1-7BB9-4548-BFF6-A4584C53FCB4}"/>
+                <a16:creationId xmlns:a16="http://schemas.microsoft.com/office/drawing/2014/main" xmlns="" id="{082DB5B1-7BB9-4548-BFF6-A4584C53FCB4}"/>
               </a:ext>
             </a:extLst>
           </p:cNvPr>
@@ -19794,7 +20168,7 @@
           <p:cNvPr id="1032" name="Picture 8" descr="Microsoft Word Logo - PNG and Vector - Logo Download">
             <a:extLst>
               <a:ext uri="{FF2B5EF4-FFF2-40B4-BE49-F238E27FC236}">
-                <a16:creationId xmlns:a16="http://schemas.microsoft.com/office/drawing/2014/main" id="{A328DD25-A748-4AF4-80C2-22F17990495E}"/>
+                <a16:creationId xmlns:a16="http://schemas.microsoft.com/office/drawing/2014/main" xmlns="" id="{A328DD25-A748-4AF4-80C2-22F17990495E}"/>
               </a:ext>
             </a:extLst>
           </p:cNvPr>
@@ -19841,7 +20215,7 @@
           <p:cNvPr id="1034" name="Picture 10" descr="Microsoft Teams Logo, history, meaning, symbol, PNG">
             <a:extLst>
               <a:ext uri="{FF2B5EF4-FFF2-40B4-BE49-F238E27FC236}">
-                <a16:creationId xmlns:a16="http://schemas.microsoft.com/office/drawing/2014/main" id="{D861D6EB-1770-4011-87F0-ACA76195BD5F}"/>
+                <a16:creationId xmlns:a16="http://schemas.microsoft.com/office/drawing/2014/main" xmlns="" id="{D861D6EB-1770-4011-87F0-ACA76195BD5F}"/>
               </a:ext>
             </a:extLst>
           </p:cNvPr>
@@ -19997,6 +20371,157 @@
         </p:nvSpPr>
         <p:spPr>
           <a:xfrm>
+            <a:off x="1670732" y="1994440"/>
+            <a:ext cx="3334800" cy="461700"/>
+          </a:xfrm>
+          <a:prstGeom prst="rect">
+            <a:avLst/>
+          </a:prstGeom>
+        </p:spPr>
+        <p:txBody>
+          <a:bodyPr spcFirstLastPara="1" wrap="square" lIns="91425" tIns="91425" rIns="91425" bIns="91425" anchor="t" anchorCtr="0">
+            <a:noAutofit/>
+          </a:bodyPr>
+          <a:lstStyle/>
+          <a:p>
+            <a:pPr marL="0" lvl="0" indent="0" algn="ctr" rtl="0">
+              <a:spcBef>
+                <a:spcPts val="0"/>
+              </a:spcBef>
+              <a:spcAft>
+                <a:spcPts val="0"/>
+              </a:spcAft>
+              <a:buNone/>
+            </a:pPr>
+            <a:r>
+              <a:rPr lang="en" dirty="0" smtClean="0"/>
+              <a:t>To add more levels</a:t>
+            </a:r>
+            <a:endParaRPr dirty="0"/>
+          </a:p>
+        </p:txBody>
+      </p:sp>
+      <p:sp>
+        <p:nvSpPr>
+          <p:cNvPr id="4" name="Заглавие 3"/>
+          <p:cNvSpPr>
+            <a:spLocks noGrp="1"/>
+          </p:cNvSpPr>
+          <p:nvPr>
+            <p:ph type="title" idx="3"/>
+          </p:nvPr>
+        </p:nvSpPr>
+        <p:spPr/>
+        <p:txBody>
+          <a:bodyPr/>
+          <a:lstStyle/>
+          <a:p>
+            <a:r>
+              <a:rPr lang="en-US" dirty="0" smtClean="0"/>
+              <a:t>Future Ideas</a:t>
+            </a:r>
+            <a:endParaRPr lang="bg-BG" dirty="0"/>
+          </a:p>
+        </p:txBody>
+      </p:sp>
+      <p:sp>
+        <p:nvSpPr>
+          <p:cNvPr id="5" name="Заглавие 4"/>
+          <p:cNvSpPr>
+            <a:spLocks noGrp="1"/>
+          </p:cNvSpPr>
+          <p:nvPr>
+            <p:ph type="title" idx="4"/>
+          </p:nvPr>
+        </p:nvSpPr>
+        <p:spPr>
+          <a:xfrm>
+            <a:off x="1832512" y="2732792"/>
+            <a:ext cx="3334800" cy="461700"/>
+          </a:xfrm>
+        </p:spPr>
+        <p:txBody>
+          <a:bodyPr/>
+          <a:lstStyle/>
+          <a:p>
+            <a:r>
+              <a:rPr lang="en-US" dirty="0" smtClean="0"/>
+              <a:t>To  improve the menu</a:t>
+            </a:r>
+            <a:endParaRPr lang="bg-BG" dirty="0"/>
+          </a:p>
+        </p:txBody>
+      </p:sp>
+      <p:sp>
+        <p:nvSpPr>
+          <p:cNvPr id="8" name="Заглавие 7"/>
+          <p:cNvSpPr>
+            <a:spLocks noGrp="1"/>
+          </p:cNvSpPr>
+          <p:nvPr>
+            <p:ph type="title" idx="7"/>
+          </p:nvPr>
+        </p:nvSpPr>
+        <p:spPr>
+          <a:xfrm>
+            <a:off x="2015390" y="3443009"/>
+            <a:ext cx="3334800" cy="461700"/>
+          </a:xfrm>
+        </p:spPr>
+        <p:txBody>
+          <a:bodyPr/>
+          <a:lstStyle/>
+          <a:p>
+            <a:r>
+              <a:rPr lang="en-US" dirty="0" smtClean="0"/>
+              <a:t>To  improve the design</a:t>
+            </a:r>
+            <a:endParaRPr lang="bg-BG" dirty="0"/>
+          </a:p>
+        </p:txBody>
+      </p:sp>
+    </p:spTree>
+    <p:extLst>
+      <p:ext uri="{BB962C8B-B14F-4D97-AF65-F5344CB8AC3E}">
+        <p14:creationId xmlns:p14="http://schemas.microsoft.com/office/powerpoint/2010/main" val="3643762883"/>
+      </p:ext>
+    </p:extLst>
+  </p:cSld>
+  <p:clrMapOvr>
+    <a:masterClrMapping/>
+  </p:clrMapOvr>
+</p:sld>
+</file>
+
+<file path=ppt/slides/slide9.xml><?xml version="1.0" encoding="utf-8"?>
+<p:sld xmlns:a="http://schemas.openxmlformats.org/drawingml/2006/main" xmlns:r="http://schemas.openxmlformats.org/officeDocument/2006/relationships" xmlns:p="http://schemas.openxmlformats.org/presentationml/2006/main">
+  <p:cSld>
+    <p:spTree>
+      <p:nvGrpSpPr>
+        <p:cNvPr id="1" name="Shape 880"/>
+        <p:cNvGrpSpPr/>
+        <p:nvPr/>
+      </p:nvGrpSpPr>
+      <p:grpSpPr>
+        <a:xfrm>
+          <a:off x="0" y="0"/>
+          <a:ext cx="0" cy="0"/>
+          <a:chOff x="0" y="0"/>
+          <a:chExt cx="0" cy="0"/>
+        </a:xfrm>
+      </p:grpSpPr>
+      <p:sp>
+        <p:nvSpPr>
+          <p:cNvPr id="906" name="Google Shape;906;p39"/>
+          <p:cNvSpPr txBox="1">
+            <a:spLocks noGrp="1"/>
+          </p:cNvSpPr>
+          <p:nvPr>
+            <p:ph type="title"/>
+          </p:nvPr>
+        </p:nvSpPr>
+        <p:spPr>
+          <a:xfrm>
             <a:off x="720525" y="451712"/>
             <a:ext cx="7703100" cy="886500"/>
           </a:xfrm>
@@ -20031,69 +20556,6 @@
     <p:extLst>
       <p:ext uri="{BB962C8B-B14F-4D97-AF65-F5344CB8AC3E}">
         <p14:creationId xmlns:p14="http://schemas.microsoft.com/office/powerpoint/2010/main" val="2858114474"/>
-      </p:ext>
-    </p:extLst>
-  </p:cSld>
-  <p:clrMapOvr>
-    <a:masterClrMapping/>
-  </p:clrMapOvr>
-</p:sld>
-</file>
-
-<file path=ppt/slides/slide9.xml><?xml version="1.0" encoding="utf-8"?>
-<p:sld xmlns:a="http://schemas.openxmlformats.org/drawingml/2006/main" xmlns:r="http://schemas.openxmlformats.org/officeDocument/2006/relationships" xmlns:p="http://schemas.openxmlformats.org/presentationml/2006/main">
-  <p:cSld>
-    <p:spTree>
-      <p:nvGrpSpPr>
-        <p:cNvPr id="1" name=""/>
-        <p:cNvGrpSpPr/>
-        <p:nvPr/>
-      </p:nvGrpSpPr>
-      <p:grpSpPr>
-        <a:xfrm>
-          <a:off x="0" y="0"/>
-          <a:ext cx="0" cy="0"/>
-          <a:chOff x="0" y="0"/>
-          <a:chExt cx="0" cy="0"/>
-        </a:xfrm>
-      </p:grpSpPr>
-      <p:sp>
-        <p:nvSpPr>
-          <p:cNvPr id="2" name="Title 1">
-            <a:extLst>
-              <a:ext uri="{FF2B5EF4-FFF2-40B4-BE49-F238E27FC236}">
-                <a16:creationId xmlns:a16="http://schemas.microsoft.com/office/drawing/2014/main" id="{3CAF83E6-3923-4A82-B08B-7E23FE183235}"/>
-              </a:ext>
-            </a:extLst>
-          </p:cNvPr>
-          <p:cNvSpPr>
-            <a:spLocks noGrp="1"/>
-          </p:cNvSpPr>
-          <p:nvPr>
-            <p:ph type="ctrTitle"/>
-          </p:nvPr>
-        </p:nvSpPr>
-        <p:spPr>
-          <a:xfrm>
-            <a:off x="2230800" y="1979100"/>
-            <a:ext cx="4682400" cy="1185300"/>
-          </a:xfrm>
-        </p:spPr>
-        <p:txBody>
-          <a:bodyPr/>
-          <a:lstStyle/>
-          <a:p>
-            <a:r>
-              <a:rPr lang="en-US" sz="6600" dirty="0"/>
-              <a:t>Thank you for your attention</a:t>
-            </a:r>
-          </a:p>
-        </p:txBody>
-      </p:sp>
-    </p:spTree>
-    <p:extLst>
-      <p:ext uri="{BB962C8B-B14F-4D97-AF65-F5344CB8AC3E}">
-        <p14:creationId xmlns:p14="http://schemas.microsoft.com/office/powerpoint/2010/main" val="3950838050"/>
       </p:ext>
     </p:extLst>
   </p:cSld>

</xml_diff>